<commit_message>
Frontend departure airports map
</commit_message>
<xml_diff>
--- a/additionalMaterial/Arcadia coding challenge.pptx
+++ b/additionalMaterial/Arcadia coding challenge.pptx
@@ -8584,30 +8584,6 @@
       </p:sp>
       <p:pic>
         <p:nvPicPr>
-          <p:cNvPr id="7" name="Imagen 6"/>
-          <p:cNvPicPr>
-            <a:picLocks noChangeAspect="1"/>
-          </p:cNvPicPr>
-          <p:nvPr/>
-        </p:nvPicPr>
-        <p:blipFill>
-          <a:blip r:embed="rId2"/>
-          <a:stretch>
-            <a:fillRect/>
-          </a:stretch>
-        </p:blipFill>
-        <p:spPr>
-          <a:xfrm>
-            <a:off x="838200" y="1550513"/>
-            <a:ext cx="5706271" cy="4201111"/>
-          </a:xfrm>
-          <a:prstGeom prst="rect">
-            <a:avLst/>
-          </a:prstGeom>
-        </p:spPr>
-      </p:pic>
-      <p:pic>
-        <p:nvPicPr>
           <p:cNvPr id="8" name="Imagen 7"/>
           <p:cNvPicPr>
             <a:picLocks noChangeAspect="1"/>
@@ -8615,7 +8591,7 @@
           <p:nvPr/>
         </p:nvPicPr>
         <p:blipFill>
-          <a:blip r:embed="rId3" cstate="print">
+          <a:blip r:embed="rId2" cstate="print">
             <a:extLst>
               <a:ext uri="{28A0092B-C50C-407E-A947-70E740481C1C}">
                 <a14:useLocalDpi xmlns:a14="http://schemas.microsoft.com/office/drawing/2010/main" val="0"/>
@@ -8638,14 +8614,188 @@
       </p:pic>
       <p:sp>
         <p:nvSpPr>
+          <p:cNvPr id="13" name="CuadroTexto 12"/>
+          <p:cNvSpPr txBox="1"/>
+          <p:nvPr/>
+        </p:nvSpPr>
+        <p:spPr>
+          <a:xfrm>
+            <a:off x="7628709" y="1360013"/>
+            <a:ext cx="1716677" cy="400110"/>
+          </a:xfrm>
+          <a:prstGeom prst="rect">
+            <a:avLst/>
+          </a:prstGeom>
+        </p:spPr>
+        <p:style>
+          <a:lnRef idx="0">
+            <a:schemeClr val="accent1"/>
+          </a:lnRef>
+          <a:fillRef idx="3">
+            <a:schemeClr val="accent1"/>
+          </a:fillRef>
+          <a:effectRef idx="3">
+            <a:schemeClr val="accent1"/>
+          </a:effectRef>
+          <a:fontRef idx="minor">
+            <a:schemeClr val="lt1"/>
+          </a:fontRef>
+        </p:style>
+        <p:txBody>
+          <a:bodyPr wrap="square" rtlCol="0">
+            <a:spAutoFit/>
+          </a:bodyPr>
+          <a:lstStyle/>
+          <a:p>
+            <a:pPr algn="ctr"/>
+            <a:r>
+              <a:rPr lang="de-DE" sz="2000" dirty="0" smtClean="0"/>
+              <a:t>Zoom In/Out</a:t>
+            </a:r>
+            <a:endParaRPr lang="de-DE" sz="2000" dirty="0"/>
+          </a:p>
+        </p:txBody>
+      </p:sp>
+      <p:sp>
+        <p:nvSpPr>
+          <p:cNvPr id="16" name="CuadroTexto 15"/>
+          <p:cNvSpPr txBox="1"/>
+          <p:nvPr/>
+        </p:nvSpPr>
+        <p:spPr>
+          <a:xfrm>
+            <a:off x="7889966" y="3030583"/>
+            <a:ext cx="2092234" cy="400110"/>
+          </a:xfrm>
+          <a:prstGeom prst="rect">
+            <a:avLst/>
+          </a:prstGeom>
+          <a:noFill/>
+        </p:spPr>
+        <p:txBody>
+          <a:bodyPr wrap="square" rtlCol="0">
+            <a:spAutoFit/>
+          </a:bodyPr>
+          <a:lstStyle/>
+          <a:p>
+            <a:r>
+              <a:rPr lang="es-ES" sz="2000" dirty="0" err="1" smtClean="0"/>
+              <a:t>Arrival</a:t>
+            </a:r>
+            <a:r>
+              <a:rPr lang="es-ES" sz="2000" dirty="0" smtClean="0"/>
+              <a:t> </a:t>
+            </a:r>
+            <a:r>
+              <a:rPr lang="es-ES" sz="2000" dirty="0" err="1" smtClean="0"/>
+              <a:t>airport</a:t>
+            </a:r>
+            <a:endParaRPr lang="es-ES" sz="2000" dirty="0"/>
+          </a:p>
+        </p:txBody>
+      </p:sp>
+      <p:sp>
+        <p:nvSpPr>
+          <p:cNvPr id="17" name="CuadroTexto 16"/>
+          <p:cNvSpPr txBox="1"/>
+          <p:nvPr/>
+        </p:nvSpPr>
+        <p:spPr>
+          <a:xfrm>
+            <a:off x="7889965" y="4022975"/>
+            <a:ext cx="2338251" cy="400110"/>
+          </a:xfrm>
+          <a:prstGeom prst="rect">
+            <a:avLst/>
+          </a:prstGeom>
+          <a:noFill/>
+        </p:spPr>
+        <p:txBody>
+          <a:bodyPr wrap="square" rtlCol="0">
+            <a:spAutoFit/>
+          </a:bodyPr>
+          <a:lstStyle/>
+          <a:p>
+            <a:r>
+              <a:rPr lang="es-ES" sz="2000" dirty="0" err="1" smtClean="0"/>
+              <a:t>Departure</a:t>
+            </a:r>
+            <a:r>
+              <a:rPr lang="es-ES" sz="2000" dirty="0" smtClean="0"/>
+              <a:t> </a:t>
+            </a:r>
+            <a:r>
+              <a:rPr lang="es-ES" sz="2000" dirty="0" err="1" smtClean="0"/>
+              <a:t>airports</a:t>
+            </a:r>
+            <a:endParaRPr lang="es-ES" sz="2000" dirty="0"/>
+          </a:p>
+        </p:txBody>
+      </p:sp>
+      <p:pic>
+        <p:nvPicPr>
+          <p:cNvPr id="4" name="Imagen 3"/>
+          <p:cNvPicPr>
+            <a:picLocks noChangeAspect="1"/>
+          </p:cNvPicPr>
+          <p:nvPr/>
+        </p:nvPicPr>
+        <p:blipFill>
+          <a:blip r:embed="rId3" cstate="print">
+            <a:extLst>
+              <a:ext uri="{28A0092B-C50C-407E-A947-70E740481C1C}">
+                <a14:useLocalDpi xmlns:a14="http://schemas.microsoft.com/office/drawing/2010/main" val="0"/>
+              </a:ext>
+            </a:extLst>
+          </a:blip>
+          <a:stretch>
+            <a:fillRect/>
+          </a:stretch>
+        </p:blipFill>
+        <p:spPr>
+          <a:xfrm>
+            <a:off x="6966855" y="3792479"/>
+            <a:ext cx="809898" cy="809898"/>
+          </a:xfrm>
+          <a:prstGeom prst="rect">
+            <a:avLst/>
+          </a:prstGeom>
+        </p:spPr>
+      </p:pic>
+      <p:pic>
+        <p:nvPicPr>
+          <p:cNvPr id="9" name="Imagen 8"/>
+          <p:cNvPicPr>
+            <a:picLocks noChangeAspect="1"/>
+          </p:cNvPicPr>
+          <p:nvPr/>
+        </p:nvPicPr>
+        <p:blipFill>
+          <a:blip r:embed="rId4"/>
+          <a:stretch>
+            <a:fillRect/>
+          </a:stretch>
+        </p:blipFill>
+        <p:spPr>
+          <a:xfrm>
+            <a:off x="650836" y="1360013"/>
+            <a:ext cx="6202807" cy="4612880"/>
+          </a:xfrm>
+          <a:prstGeom prst="rect">
+            <a:avLst/>
+          </a:prstGeom>
+        </p:spPr>
+      </p:pic>
+      <p:sp>
+        <p:nvSpPr>
           <p:cNvPr id="12" name="Rectángulo 11"/>
           <p:cNvSpPr/>
           <p:nvPr/>
         </p:nvSpPr>
         <p:spPr>
           <a:xfrm>
-            <a:off x="5303520" y="1690688"/>
-            <a:ext cx="1058091" cy="386306"/>
+            <a:off x="5473338" y="1687839"/>
+            <a:ext cx="1151708" cy="386306"/>
           </a:xfrm>
           <a:prstGeom prst="rect">
             <a:avLst/>
@@ -8682,60 +8832,18 @@
           </a:p>
         </p:txBody>
       </p:sp>
-      <p:sp>
-        <p:nvSpPr>
-          <p:cNvPr id="13" name="CuadroTexto 12"/>
-          <p:cNvSpPr txBox="1"/>
-          <p:nvPr/>
-        </p:nvSpPr>
-        <p:spPr>
-          <a:xfrm>
-            <a:off x="7628709" y="1360013"/>
-            <a:ext cx="1716677" cy="400110"/>
-          </a:xfrm>
-          <a:prstGeom prst="rect">
-            <a:avLst/>
-          </a:prstGeom>
-        </p:spPr>
-        <p:style>
-          <a:lnRef idx="0">
-            <a:schemeClr val="accent1"/>
-          </a:lnRef>
-          <a:fillRef idx="3">
-            <a:schemeClr val="accent1"/>
-          </a:fillRef>
-          <a:effectRef idx="3">
-            <a:schemeClr val="accent1"/>
-          </a:effectRef>
-          <a:fontRef idx="minor">
-            <a:schemeClr val="lt1"/>
-          </a:fontRef>
-        </p:style>
-        <p:txBody>
-          <a:bodyPr wrap="square" rtlCol="0">
-            <a:spAutoFit/>
-          </a:bodyPr>
-          <a:lstStyle/>
-          <a:p>
-            <a:pPr algn="ctr"/>
-            <a:r>
-              <a:rPr lang="de-DE" sz="2000" dirty="0" smtClean="0"/>
-              <a:t>Zoom In/Out</a:t>
-            </a:r>
-            <a:endParaRPr lang="de-DE" sz="2000" dirty="0"/>
-          </a:p>
-        </p:txBody>
-      </p:sp>
       <p:cxnSp>
         <p:nvCxnSpPr>
           <p:cNvPr id="14" name="Conector recto de flecha 13"/>
-          <p:cNvCxnSpPr/>
+          <p:cNvCxnSpPr>
+            <a:stCxn id="12" idx="3"/>
+          </p:cNvCxnSpPr>
           <p:nvPr/>
         </p:nvCxnSpPr>
         <p:spPr>
           <a:xfrm flipV="1">
-            <a:off x="6361611" y="1619948"/>
-            <a:ext cx="1267098" cy="303668"/>
+            <a:off x="6625046" y="1619948"/>
+            <a:ext cx="1003663" cy="261044"/>
           </a:xfrm>
           <a:prstGeom prst="straightConnector1">
             <a:avLst/>
@@ -8759,112 +8867,6 @@
           </a:fontRef>
         </p:style>
       </p:cxnSp>
-      <p:sp>
-        <p:nvSpPr>
-          <p:cNvPr id="16" name="CuadroTexto 15"/>
-          <p:cNvSpPr txBox="1"/>
-          <p:nvPr/>
-        </p:nvSpPr>
-        <p:spPr>
-          <a:xfrm>
-            <a:off x="7889966" y="3030583"/>
-            <a:ext cx="2092234" cy="400110"/>
-          </a:xfrm>
-          <a:prstGeom prst="rect">
-            <a:avLst/>
-          </a:prstGeom>
-          <a:noFill/>
-        </p:spPr>
-        <p:txBody>
-          <a:bodyPr wrap="square" rtlCol="0">
-            <a:spAutoFit/>
-          </a:bodyPr>
-          <a:lstStyle/>
-          <a:p>
-            <a:r>
-              <a:rPr lang="es-ES" sz="2000" dirty="0" err="1" smtClean="0"/>
-              <a:t>Arrival</a:t>
-            </a:r>
-            <a:r>
-              <a:rPr lang="es-ES" sz="2000" dirty="0" smtClean="0"/>
-              <a:t> </a:t>
-            </a:r>
-            <a:r>
-              <a:rPr lang="es-ES" sz="2000" dirty="0" err="1" smtClean="0"/>
-              <a:t>airport</a:t>
-            </a:r>
-            <a:endParaRPr lang="es-ES" sz="2000" dirty="0"/>
-          </a:p>
-        </p:txBody>
-      </p:sp>
-      <p:sp>
-        <p:nvSpPr>
-          <p:cNvPr id="17" name="CuadroTexto 16"/>
-          <p:cNvSpPr txBox="1"/>
-          <p:nvPr/>
-        </p:nvSpPr>
-        <p:spPr>
-          <a:xfrm>
-            <a:off x="7889965" y="4022975"/>
-            <a:ext cx="2338251" cy="400110"/>
-          </a:xfrm>
-          <a:prstGeom prst="rect">
-            <a:avLst/>
-          </a:prstGeom>
-          <a:noFill/>
-        </p:spPr>
-        <p:txBody>
-          <a:bodyPr wrap="square" rtlCol="0">
-            <a:spAutoFit/>
-          </a:bodyPr>
-          <a:lstStyle/>
-          <a:p>
-            <a:r>
-              <a:rPr lang="es-ES" sz="2000" dirty="0" err="1" smtClean="0"/>
-              <a:t>Departure</a:t>
-            </a:r>
-            <a:r>
-              <a:rPr lang="es-ES" sz="2000" dirty="0" smtClean="0"/>
-              <a:t> </a:t>
-            </a:r>
-            <a:r>
-              <a:rPr lang="es-ES" sz="2000" dirty="0" err="1" smtClean="0"/>
-              <a:t>airports</a:t>
-            </a:r>
-            <a:endParaRPr lang="es-ES" sz="2000" dirty="0"/>
-          </a:p>
-        </p:txBody>
-      </p:sp>
-      <p:pic>
-        <p:nvPicPr>
-          <p:cNvPr id="4" name="Imagen 3"/>
-          <p:cNvPicPr>
-            <a:picLocks noChangeAspect="1"/>
-          </p:cNvPicPr>
-          <p:nvPr/>
-        </p:nvPicPr>
-        <p:blipFill>
-          <a:blip r:embed="rId4" cstate="print">
-            <a:extLst>
-              <a:ext uri="{28A0092B-C50C-407E-A947-70E740481C1C}">
-                <a14:useLocalDpi xmlns:a14="http://schemas.microsoft.com/office/drawing/2010/main" val="0"/>
-              </a:ext>
-            </a:extLst>
-          </a:blip>
-          <a:stretch>
-            <a:fillRect/>
-          </a:stretch>
-        </p:blipFill>
-        <p:spPr>
-          <a:xfrm>
-            <a:off x="6966855" y="3792479"/>
-            <a:ext cx="809898" cy="809898"/>
-          </a:xfrm>
-          <a:prstGeom prst="rect">
-            <a:avLst/>
-          </a:prstGeom>
-        </p:spPr>
-      </p:pic>
     </p:spTree>
     <p:extLst>
       <p:ext uri="{BB962C8B-B14F-4D97-AF65-F5344CB8AC3E}">

</xml_diff>